<commit_message>
J Chromatogr B Paper, Korrekturen
</commit_message>
<xml_diff>
--- a/doc/Publications/JChromatogrB-InCroMAP/InCroMAP_workflow.pptx
+++ b/doc/Publications/JChromatogrB-InCroMAP/InCroMAP_workflow.pptx
@@ -2,12 +2,12 @@
 <file path=ppt/presentation.xml><?xml version="1.0" encoding="utf-8"?>
 <p:presentation xmlns:a="http://schemas.openxmlformats.org/drawingml/2006/main" xmlns:r="http://schemas.openxmlformats.org/officeDocument/2006/relationships" xmlns:p="http://schemas.openxmlformats.org/presentationml/2006/main" saveSubsetFonts="1">
   <p:sldMasterIdLst>
-    <p:sldMasterId id="2147483732" r:id="rId1"/>
+    <p:sldMasterId id="2147483756" r:id="rId1"/>
   </p:sldMasterIdLst>
   <p:sldIdLst>
     <p:sldId id="256" r:id="rId2"/>
   </p:sldIdLst>
-  <p:sldSz cx="6858000" cy="8466138"/>
+  <p:sldSz cx="6858000" cy="9042400"/>
   <p:notesSz cx="6858000" cy="9144000"/>
   <p:defaultTextStyle>
     <a:defPPr>
@@ -107,12 +107,12 @@
   <p:extLst>
     <p:ext uri="{EFAFB233-063F-42B5-8137-9DF3F51BA10A}">
       <p15:sldGuideLst xmlns:p15="http://schemas.microsoft.com/office/powerpoint/2012/main">
-        <p15:guide id="1" orient="horz" pos="2666">
+        <p15:guide id="1" orient="horz" pos="2848" userDrawn="1">
           <p15:clr>
             <a:srgbClr val="A4A3A4"/>
           </p15:clr>
         </p15:guide>
-        <p15:guide id="2" pos="2160">
+        <p15:guide id="2" pos="2160" userDrawn="1">
           <p15:clr>
             <a:srgbClr val="A4A3A4"/>
           </p15:clr>
@@ -152,8 +152,8 @@
         </p:nvSpPr>
         <p:spPr>
           <a:xfrm>
-            <a:off x="514350" y="1385547"/>
-            <a:ext cx="5829300" cy="2947470"/>
+            <a:off x="514350" y="1479856"/>
+            <a:ext cx="5829300" cy="3148095"/>
           </a:xfrm>
         </p:spPr>
         <p:txBody>
@@ -184,8 +184,8 @@
         </p:nvSpPr>
         <p:spPr>
           <a:xfrm>
-            <a:off x="857250" y="4446683"/>
-            <a:ext cx="5143500" cy="2044023"/>
+            <a:off x="857250" y="4749354"/>
+            <a:ext cx="5143500" cy="2183153"/>
           </a:xfrm>
         </p:spPr>
         <p:txBody>
@@ -255,7 +255,7 @@
             <a:fld id="{AAAB5D53-F5E7-436B-85BB-F08817CA0FEF}" type="datetimeFigureOut">
               <a:rPr lang="de-DE" smtClean="0"/>
               <a:pPr/>
-              <a:t>19.08.2013</a:t>
+              <a:t>26.08.2013</a:t>
             </a:fld>
             <a:endParaRPr lang="de-DE"/>
           </a:p>
@@ -307,7 +307,7 @@
     </p:spTree>
     <p:extLst>
       <p:ext uri="{BB962C8B-B14F-4D97-AF65-F5344CB8AC3E}">
-        <p14:creationId xmlns:p14="http://schemas.microsoft.com/office/powerpoint/2010/main" val="1078272058"/>
+        <p14:creationId xmlns:p14="http://schemas.microsoft.com/office/powerpoint/2010/main" val="538844912"/>
       </p:ext>
     </p:extLst>
   </p:cSld>
@@ -427,7 +427,7 @@
             <a:fld id="{AAAB5D53-F5E7-436B-85BB-F08817CA0FEF}" type="datetimeFigureOut">
               <a:rPr lang="de-DE" smtClean="0"/>
               <a:pPr/>
-              <a:t>19.08.2013</a:t>
+              <a:t>26.08.2013</a:t>
             </a:fld>
             <a:endParaRPr lang="de-DE"/>
           </a:p>
@@ -479,7 +479,7 @@
     </p:spTree>
     <p:extLst>
       <p:ext uri="{BB962C8B-B14F-4D97-AF65-F5344CB8AC3E}">
-        <p14:creationId xmlns:p14="http://schemas.microsoft.com/office/powerpoint/2010/main" val="1311255380"/>
+        <p14:creationId xmlns:p14="http://schemas.microsoft.com/office/powerpoint/2010/main" val="3537502311"/>
       </p:ext>
     </p:extLst>
   </p:cSld>
@@ -518,8 +518,8 @@
         </p:nvSpPr>
         <p:spPr>
           <a:xfrm>
-            <a:off x="4907757" y="450743"/>
-            <a:ext cx="1478756" cy="7174661"/>
+            <a:off x="4907757" y="481424"/>
+            <a:ext cx="1478756" cy="7663016"/>
           </a:xfrm>
         </p:spPr>
         <p:txBody>
@@ -546,8 +546,8 @@
         </p:nvSpPr>
         <p:spPr>
           <a:xfrm>
-            <a:off x="471488" y="450743"/>
-            <a:ext cx="4350544" cy="7174661"/>
+            <a:off x="471488" y="481424"/>
+            <a:ext cx="4350544" cy="7663016"/>
           </a:xfrm>
         </p:spPr>
         <p:txBody>
@@ -609,7 +609,7 @@
             <a:fld id="{AAAB5D53-F5E7-436B-85BB-F08817CA0FEF}" type="datetimeFigureOut">
               <a:rPr lang="de-DE" smtClean="0"/>
               <a:pPr/>
-              <a:t>19.08.2013</a:t>
+              <a:t>26.08.2013</a:t>
             </a:fld>
             <a:endParaRPr lang="de-DE"/>
           </a:p>
@@ -661,7 +661,7 @@
     </p:spTree>
     <p:extLst>
       <p:ext uri="{BB962C8B-B14F-4D97-AF65-F5344CB8AC3E}">
-        <p14:creationId xmlns:p14="http://schemas.microsoft.com/office/powerpoint/2010/main" val="1982335472"/>
+        <p14:creationId xmlns:p14="http://schemas.microsoft.com/office/powerpoint/2010/main" val="3147751996"/>
       </p:ext>
     </p:extLst>
   </p:cSld>
@@ -781,7 +781,7 @@
             <a:fld id="{AAAB5D53-F5E7-436B-85BB-F08817CA0FEF}" type="datetimeFigureOut">
               <a:rPr lang="de-DE" smtClean="0"/>
               <a:pPr/>
-              <a:t>19.08.2013</a:t>
+              <a:t>26.08.2013</a:t>
             </a:fld>
             <a:endParaRPr lang="de-DE"/>
           </a:p>
@@ -833,7 +833,7 @@
     </p:spTree>
     <p:extLst>
       <p:ext uri="{BB962C8B-B14F-4D97-AF65-F5344CB8AC3E}">
-        <p14:creationId xmlns:p14="http://schemas.microsoft.com/office/powerpoint/2010/main" val="4176661520"/>
+        <p14:creationId xmlns:p14="http://schemas.microsoft.com/office/powerpoint/2010/main" val="2518353221"/>
       </p:ext>
     </p:extLst>
   </p:cSld>
@@ -872,8 +872,8 @@
         </p:nvSpPr>
         <p:spPr>
           <a:xfrm>
-            <a:off x="467916" y="2110658"/>
-            <a:ext cx="5915025" cy="3521678"/>
+            <a:off x="467916" y="2254323"/>
+            <a:ext cx="5915025" cy="3761387"/>
           </a:xfrm>
         </p:spPr>
         <p:txBody>
@@ -904,8 +904,8 @@
         </p:nvSpPr>
         <p:spPr>
           <a:xfrm>
-            <a:off x="467916" y="5665652"/>
-            <a:ext cx="5915025" cy="1851967"/>
+            <a:off x="467916" y="6051294"/>
+            <a:ext cx="5915025" cy="1978024"/>
           </a:xfrm>
         </p:spPr>
         <p:txBody>
@@ -1027,7 +1027,7 @@
             <a:fld id="{AAAB5D53-F5E7-436B-85BB-F08817CA0FEF}" type="datetimeFigureOut">
               <a:rPr lang="de-DE" smtClean="0"/>
               <a:pPr/>
-              <a:t>19.08.2013</a:t>
+              <a:t>26.08.2013</a:t>
             </a:fld>
             <a:endParaRPr lang="de-DE"/>
           </a:p>
@@ -1079,7 +1079,7 @@
     </p:spTree>
     <p:extLst>
       <p:ext uri="{BB962C8B-B14F-4D97-AF65-F5344CB8AC3E}">
-        <p14:creationId xmlns:p14="http://schemas.microsoft.com/office/powerpoint/2010/main" val="1806995945"/>
+        <p14:creationId xmlns:p14="http://schemas.microsoft.com/office/powerpoint/2010/main" val="3564631376"/>
       </p:ext>
     </p:extLst>
   </p:cSld>
@@ -1141,8 +1141,8 @@
         </p:nvSpPr>
         <p:spPr>
           <a:xfrm>
-            <a:off x="471488" y="2253717"/>
-            <a:ext cx="2914650" cy="5371687"/>
+            <a:off x="471488" y="2407120"/>
+            <a:ext cx="2914650" cy="5737320"/>
           </a:xfrm>
         </p:spPr>
         <p:txBody>
@@ -1198,8 +1198,8 @@
         </p:nvSpPr>
         <p:spPr>
           <a:xfrm>
-            <a:off x="3471863" y="2253717"/>
-            <a:ext cx="2914650" cy="5371687"/>
+            <a:off x="3471863" y="2407120"/>
+            <a:ext cx="2914650" cy="5737320"/>
           </a:xfrm>
         </p:spPr>
         <p:txBody>
@@ -1261,7 +1261,7 @@
             <a:fld id="{AAAB5D53-F5E7-436B-85BB-F08817CA0FEF}" type="datetimeFigureOut">
               <a:rPr lang="de-DE" smtClean="0"/>
               <a:pPr/>
-              <a:t>19.08.2013</a:t>
+              <a:t>26.08.2013</a:t>
             </a:fld>
             <a:endParaRPr lang="de-DE"/>
           </a:p>
@@ -1313,7 +1313,7 @@
     </p:spTree>
     <p:extLst>
       <p:ext uri="{BB962C8B-B14F-4D97-AF65-F5344CB8AC3E}">
-        <p14:creationId xmlns:p14="http://schemas.microsoft.com/office/powerpoint/2010/main" val="2037762447"/>
+        <p14:creationId xmlns:p14="http://schemas.microsoft.com/office/powerpoint/2010/main" val="574855257"/>
       </p:ext>
     </p:extLst>
   </p:cSld>
@@ -1352,8 +1352,8 @@
         </p:nvSpPr>
         <p:spPr>
           <a:xfrm>
-            <a:off x="472381" y="450745"/>
-            <a:ext cx="5915025" cy="1636395"/>
+            <a:off x="472381" y="481426"/>
+            <a:ext cx="5915025" cy="1747779"/>
           </a:xfrm>
         </p:spPr>
         <p:txBody>
@@ -1380,8 +1380,8 @@
         </p:nvSpPr>
         <p:spPr>
           <a:xfrm>
-            <a:off x="472381" y="2075380"/>
-            <a:ext cx="2901255" cy="1017112"/>
+            <a:off x="472381" y="2216645"/>
+            <a:ext cx="2901255" cy="1086343"/>
           </a:xfrm>
         </p:spPr>
         <p:txBody>
@@ -1445,8 +1445,8 @@
         </p:nvSpPr>
         <p:spPr>
           <a:xfrm>
-            <a:off x="472381" y="3092492"/>
-            <a:ext cx="2901255" cy="4548590"/>
+            <a:off x="472381" y="3302988"/>
+            <a:ext cx="2901255" cy="4858198"/>
           </a:xfrm>
         </p:spPr>
         <p:txBody>
@@ -1502,8 +1502,8 @@
         </p:nvSpPr>
         <p:spPr>
           <a:xfrm>
-            <a:off x="3471863" y="2075380"/>
-            <a:ext cx="2915543" cy="1017112"/>
+            <a:off x="3471863" y="2216645"/>
+            <a:ext cx="2915543" cy="1086343"/>
           </a:xfrm>
         </p:spPr>
         <p:txBody>
@@ -1567,8 +1567,8 @@
         </p:nvSpPr>
         <p:spPr>
           <a:xfrm>
-            <a:off x="3471863" y="3092492"/>
-            <a:ext cx="2915543" cy="4548590"/>
+            <a:off x="3471863" y="3302988"/>
+            <a:ext cx="2915543" cy="4858198"/>
           </a:xfrm>
         </p:spPr>
         <p:txBody>
@@ -1630,7 +1630,7 @@
             <a:fld id="{AAAB5D53-F5E7-436B-85BB-F08817CA0FEF}" type="datetimeFigureOut">
               <a:rPr lang="de-DE" smtClean="0"/>
               <a:pPr/>
-              <a:t>19.08.2013</a:t>
+              <a:t>26.08.2013</a:t>
             </a:fld>
             <a:endParaRPr lang="de-DE"/>
           </a:p>
@@ -1682,7 +1682,7 @@
     </p:spTree>
     <p:extLst>
       <p:ext uri="{BB962C8B-B14F-4D97-AF65-F5344CB8AC3E}">
-        <p14:creationId xmlns:p14="http://schemas.microsoft.com/office/powerpoint/2010/main" val="4227992094"/>
+        <p14:creationId xmlns:p14="http://schemas.microsoft.com/office/powerpoint/2010/main" val="369256133"/>
       </p:ext>
     </p:extLst>
   </p:cSld>
@@ -1750,7 +1750,7 @@
             <a:fld id="{AAAB5D53-F5E7-436B-85BB-F08817CA0FEF}" type="datetimeFigureOut">
               <a:rPr lang="de-DE" smtClean="0"/>
               <a:pPr/>
-              <a:t>19.08.2013</a:t>
+              <a:t>26.08.2013</a:t>
             </a:fld>
             <a:endParaRPr lang="de-DE"/>
           </a:p>
@@ -1802,7 +1802,7 @@
     </p:spTree>
     <p:extLst>
       <p:ext uri="{BB962C8B-B14F-4D97-AF65-F5344CB8AC3E}">
-        <p14:creationId xmlns:p14="http://schemas.microsoft.com/office/powerpoint/2010/main" val="3902939582"/>
+        <p14:creationId xmlns:p14="http://schemas.microsoft.com/office/powerpoint/2010/main" val="1172405678"/>
       </p:ext>
     </p:extLst>
   </p:cSld>
@@ -1847,7 +1847,7 @@
             <a:fld id="{AAAB5D53-F5E7-436B-85BB-F08817CA0FEF}" type="datetimeFigureOut">
               <a:rPr lang="de-DE" smtClean="0"/>
               <a:pPr/>
-              <a:t>19.08.2013</a:t>
+              <a:t>26.08.2013</a:t>
             </a:fld>
             <a:endParaRPr lang="de-DE"/>
           </a:p>
@@ -1899,7 +1899,7 @@
     </p:spTree>
     <p:extLst>
       <p:ext uri="{BB962C8B-B14F-4D97-AF65-F5344CB8AC3E}">
-        <p14:creationId xmlns:p14="http://schemas.microsoft.com/office/powerpoint/2010/main" val="3318743799"/>
+        <p14:creationId xmlns:p14="http://schemas.microsoft.com/office/powerpoint/2010/main" val="2245240957"/>
       </p:ext>
     </p:extLst>
   </p:cSld>
@@ -1938,8 +1938,8 @@
         </p:nvSpPr>
         <p:spPr>
           <a:xfrm>
-            <a:off x="472381" y="564409"/>
-            <a:ext cx="2211884" cy="1975432"/>
+            <a:off x="472381" y="602827"/>
+            <a:ext cx="2211884" cy="2109893"/>
           </a:xfrm>
         </p:spPr>
         <p:txBody>
@@ -1970,8 +1970,8 @@
         </p:nvSpPr>
         <p:spPr>
           <a:xfrm>
-            <a:off x="2915543" y="1218969"/>
-            <a:ext cx="3471863" cy="6016445"/>
+            <a:off x="2915543" y="1301940"/>
+            <a:ext cx="3471863" cy="6425965"/>
           </a:xfrm>
         </p:spPr>
         <p:txBody>
@@ -2055,8 +2055,8 @@
         </p:nvSpPr>
         <p:spPr>
           <a:xfrm>
-            <a:off x="472381" y="2539842"/>
-            <a:ext cx="2211884" cy="4705370"/>
+            <a:off x="472381" y="2712720"/>
+            <a:ext cx="2211884" cy="5025649"/>
           </a:xfrm>
         </p:spPr>
         <p:txBody>
@@ -2126,7 +2126,7 @@
             <a:fld id="{AAAB5D53-F5E7-436B-85BB-F08817CA0FEF}" type="datetimeFigureOut">
               <a:rPr lang="de-DE" smtClean="0"/>
               <a:pPr/>
-              <a:t>19.08.2013</a:t>
+              <a:t>26.08.2013</a:t>
             </a:fld>
             <a:endParaRPr lang="de-DE"/>
           </a:p>
@@ -2178,7 +2178,7 @@
     </p:spTree>
     <p:extLst>
       <p:ext uri="{BB962C8B-B14F-4D97-AF65-F5344CB8AC3E}">
-        <p14:creationId xmlns:p14="http://schemas.microsoft.com/office/powerpoint/2010/main" val="3891305701"/>
+        <p14:creationId xmlns:p14="http://schemas.microsoft.com/office/powerpoint/2010/main" val="299738601"/>
       </p:ext>
     </p:extLst>
   </p:cSld>
@@ -2217,8 +2217,8 @@
         </p:nvSpPr>
         <p:spPr>
           <a:xfrm>
-            <a:off x="472381" y="564409"/>
-            <a:ext cx="2211884" cy="1975432"/>
+            <a:off x="472381" y="602827"/>
+            <a:ext cx="2211884" cy="2109893"/>
           </a:xfrm>
         </p:spPr>
         <p:txBody>
@@ -2249,8 +2249,8 @@
         </p:nvSpPr>
         <p:spPr>
           <a:xfrm>
-            <a:off x="2915543" y="1218969"/>
-            <a:ext cx="3471863" cy="6016445"/>
+            <a:off x="2915543" y="1301940"/>
+            <a:ext cx="3471863" cy="6425965"/>
           </a:xfrm>
         </p:spPr>
         <p:txBody>
@@ -2314,8 +2314,8 @@
         </p:nvSpPr>
         <p:spPr>
           <a:xfrm>
-            <a:off x="472381" y="2539842"/>
-            <a:ext cx="2211884" cy="4705370"/>
+            <a:off x="472381" y="2712720"/>
+            <a:ext cx="2211884" cy="5025649"/>
           </a:xfrm>
         </p:spPr>
         <p:txBody>
@@ -2385,7 +2385,7 @@
             <a:fld id="{AAAB5D53-F5E7-436B-85BB-F08817CA0FEF}" type="datetimeFigureOut">
               <a:rPr lang="de-DE" smtClean="0"/>
               <a:pPr/>
-              <a:t>19.08.2013</a:t>
+              <a:t>26.08.2013</a:t>
             </a:fld>
             <a:endParaRPr lang="de-DE"/>
           </a:p>
@@ -2437,7 +2437,7 @@
     </p:spTree>
     <p:extLst>
       <p:ext uri="{BB962C8B-B14F-4D97-AF65-F5344CB8AC3E}">
-        <p14:creationId xmlns:p14="http://schemas.microsoft.com/office/powerpoint/2010/main" val="2420284523"/>
+        <p14:creationId xmlns:p14="http://schemas.microsoft.com/office/powerpoint/2010/main" val="2771024177"/>
       </p:ext>
     </p:extLst>
   </p:cSld>
@@ -2481,8 +2481,8 @@
         </p:nvSpPr>
         <p:spPr>
           <a:xfrm>
-            <a:off x="471488" y="450745"/>
-            <a:ext cx="5915025" cy="1636395"/>
+            <a:off x="471488" y="481426"/>
+            <a:ext cx="5915025" cy="1747779"/>
           </a:xfrm>
           <a:prstGeom prst="rect">
             <a:avLst/>
@@ -2514,8 +2514,8 @@
         </p:nvSpPr>
         <p:spPr>
           <a:xfrm>
-            <a:off x="471488" y="2253717"/>
-            <a:ext cx="5915025" cy="5371687"/>
+            <a:off x="471488" y="2407120"/>
+            <a:ext cx="5915025" cy="5737320"/>
           </a:xfrm>
           <a:prstGeom prst="rect">
             <a:avLst/>
@@ -2576,8 +2576,8 @@
         </p:nvSpPr>
         <p:spPr>
           <a:xfrm>
-            <a:off x="471488" y="7846858"/>
-            <a:ext cx="1543050" cy="450743"/>
+            <a:off x="471488" y="8380967"/>
+            <a:ext cx="1543050" cy="481424"/>
           </a:xfrm>
           <a:prstGeom prst="rect">
             <a:avLst/>
@@ -2600,7 +2600,7 @@
             <a:fld id="{AAAB5D53-F5E7-436B-85BB-F08817CA0FEF}" type="datetimeFigureOut">
               <a:rPr lang="de-DE" smtClean="0"/>
               <a:pPr/>
-              <a:t>19.08.2013</a:t>
+              <a:t>26.08.2013</a:t>
             </a:fld>
             <a:endParaRPr lang="de-DE"/>
           </a:p>
@@ -2618,8 +2618,8 @@
         </p:nvSpPr>
         <p:spPr>
           <a:xfrm>
-            <a:off x="2271713" y="7846858"/>
-            <a:ext cx="2314575" cy="450743"/>
+            <a:off x="2271713" y="8380967"/>
+            <a:ext cx="2314575" cy="481424"/>
           </a:xfrm>
           <a:prstGeom prst="rect">
             <a:avLst/>
@@ -2655,8 +2655,8 @@
         </p:nvSpPr>
         <p:spPr>
           <a:xfrm>
-            <a:off x="4843463" y="7846858"/>
-            <a:ext cx="1543050" cy="450743"/>
+            <a:off x="4843463" y="8380967"/>
+            <a:ext cx="1543050" cy="481424"/>
           </a:xfrm>
           <a:prstGeom prst="rect">
             <a:avLst/>
@@ -2688,23 +2688,23 @@
     </p:spTree>
     <p:extLst>
       <p:ext uri="{BB962C8B-B14F-4D97-AF65-F5344CB8AC3E}">
-        <p14:creationId xmlns:p14="http://schemas.microsoft.com/office/powerpoint/2010/main" val="1784323492"/>
+        <p14:creationId xmlns:p14="http://schemas.microsoft.com/office/powerpoint/2010/main" val="3681904036"/>
       </p:ext>
     </p:extLst>
   </p:cSld>
   <p:clrMap bg1="lt1" tx1="dk1" bg2="lt2" tx2="dk2" accent1="accent1" accent2="accent2" accent3="accent3" accent4="accent4" accent5="accent5" accent6="accent6" hlink="hlink" folHlink="folHlink"/>
   <p:sldLayoutIdLst>
-    <p:sldLayoutId id="2147483733" r:id="rId1"/>
-    <p:sldLayoutId id="2147483734" r:id="rId2"/>
-    <p:sldLayoutId id="2147483735" r:id="rId3"/>
-    <p:sldLayoutId id="2147483736" r:id="rId4"/>
-    <p:sldLayoutId id="2147483737" r:id="rId5"/>
-    <p:sldLayoutId id="2147483738" r:id="rId6"/>
-    <p:sldLayoutId id="2147483739" r:id="rId7"/>
-    <p:sldLayoutId id="2147483740" r:id="rId8"/>
-    <p:sldLayoutId id="2147483741" r:id="rId9"/>
-    <p:sldLayoutId id="2147483742" r:id="rId10"/>
-    <p:sldLayoutId id="2147483743" r:id="rId11"/>
+    <p:sldLayoutId id="2147483757" r:id="rId1"/>
+    <p:sldLayoutId id="2147483758" r:id="rId2"/>
+    <p:sldLayoutId id="2147483759" r:id="rId3"/>
+    <p:sldLayoutId id="2147483760" r:id="rId4"/>
+    <p:sldLayoutId id="2147483761" r:id="rId5"/>
+    <p:sldLayoutId id="2147483762" r:id="rId6"/>
+    <p:sldLayoutId id="2147483763" r:id="rId7"/>
+    <p:sldLayoutId id="2147483764" r:id="rId8"/>
+    <p:sldLayoutId id="2147483765" r:id="rId9"/>
+    <p:sldLayoutId id="2147483766" r:id="rId10"/>
+    <p:sldLayoutId id="2147483767" r:id="rId11"/>
   </p:sldLayoutIdLst>
   <p:txStyles>
     <p:titleStyle>
@@ -3014,7 +3014,7 @@
         </p:nvSpPr>
         <p:spPr>
           <a:xfrm>
-            <a:off x="171454" y="92079"/>
+            <a:off x="171462" y="713267"/>
             <a:ext cx="1180381" cy="378000"/>
           </a:xfrm>
           <a:prstGeom prst="roundRect">
@@ -3054,7 +3054,7 @@
                   <a:schemeClr val="tx1"/>
                 </a:solidFill>
               </a:rPr>
-              <a:t>mRNA</a:t>
+              <a:t>DNAm</a:t>
             </a:r>
             <a:endParaRPr lang="de-DE" sz="1200" dirty="0">
               <a:solidFill>
@@ -3072,7 +3072,7 @@
         </p:nvSpPr>
         <p:spPr>
           <a:xfrm>
-            <a:off x="2855016" y="88618"/>
+            <a:off x="2855024" y="709806"/>
             <a:ext cx="1180381" cy="378000"/>
           </a:xfrm>
           <a:prstGeom prst="roundRect">
@@ -3112,7 +3112,7 @@
                   <a:schemeClr val="tx1"/>
                 </a:solidFill>
               </a:rPr>
-              <a:t>DNAm</a:t>
+              <a:t>miRNA</a:t>
             </a:r>
             <a:endParaRPr lang="de-DE" sz="1200" dirty="0">
               <a:solidFill>
@@ -3130,7 +3130,7 @@
         </p:nvSpPr>
         <p:spPr>
           <a:xfrm>
-            <a:off x="4196795" y="88184"/>
+            <a:off x="4196803" y="709372"/>
             <a:ext cx="1180381" cy="378000"/>
           </a:xfrm>
           <a:prstGeom prst="roundRect">
@@ -3170,8 +3170,21 @@
                   <a:schemeClr val="tx1"/>
                 </a:solidFill>
               </a:rPr>
-              <a:t>Protein</a:t>
-            </a:r>
+              <a:t>Protein </a:t>
+            </a:r>
+            <a:r>
+              <a:rPr lang="de-DE" sz="1200" dirty="0" err="1">
+                <a:solidFill>
+                  <a:schemeClr val="tx1"/>
+                </a:solidFill>
+              </a:rPr>
+              <a:t>features</a:t>
+            </a:r>
+            <a:endParaRPr lang="de-DE" sz="1200" dirty="0">
+              <a:solidFill>
+                <a:schemeClr val="tx1"/>
+              </a:solidFill>
+            </a:endParaRPr>
           </a:p>
         </p:txBody>
       </p:sp>
@@ -3183,7 +3196,7 @@
         </p:nvSpPr>
         <p:spPr>
           <a:xfrm>
-            <a:off x="1513236" y="88618"/>
+            <a:off x="1513244" y="709806"/>
             <a:ext cx="1180381" cy="378000"/>
           </a:xfrm>
           <a:prstGeom prst="roundRect">
@@ -3223,7 +3236,7 @@
                   <a:schemeClr val="tx1"/>
                 </a:solidFill>
               </a:rPr>
-              <a:t>miRNA</a:t>
+              <a:t>mRNA</a:t>
             </a:r>
             <a:endParaRPr lang="de-DE" sz="1200" dirty="0">
               <a:solidFill>
@@ -3241,7 +3254,7 @@
         </p:nvSpPr>
         <p:spPr>
           <a:xfrm>
-            <a:off x="5538578" y="91730"/>
+            <a:off x="5538586" y="712918"/>
             <a:ext cx="1180381" cy="378000"/>
           </a:xfrm>
           <a:prstGeom prst="roundRect">
@@ -3283,6 +3296,22 @@
               </a:rPr>
               <a:t>Metabolite</a:t>
             </a:r>
+            <a:r>
+              <a:rPr lang="de-DE" sz="1200" dirty="0">
+                <a:solidFill>
+                  <a:schemeClr val="tx1"/>
+                </a:solidFill>
+              </a:rPr>
+              <a:t> </a:t>
+            </a:r>
+            <a:r>
+              <a:rPr lang="de-DE" sz="1200" dirty="0" err="1">
+                <a:solidFill>
+                  <a:schemeClr val="tx1"/>
+                </a:solidFill>
+              </a:rPr>
+              <a:t>features</a:t>
+            </a:r>
             <a:endParaRPr lang="de-DE" sz="1200" dirty="0">
               <a:solidFill>
                 <a:schemeClr val="tx1"/>
@@ -3299,8 +3328,8 @@
         </p:nvSpPr>
         <p:spPr>
           <a:xfrm>
-            <a:off x="5532495" y="781963"/>
-            <a:ext cx="1180381" cy="378000"/>
+            <a:off x="4196803" y="1400294"/>
+            <a:ext cx="2516081" cy="378000"/>
           </a:xfrm>
           <a:prstGeom prst="roundRect">
             <a:avLst/>
@@ -3334,7 +3363,7 @@
           <a:p>
             <a:pPr algn="ctr"/>
             <a:r>
-              <a:rPr lang="de-DE" sz="1100">
+              <a:rPr lang="de-DE" sz="1100" dirty="0" err="1" smtClean="0">
                 <a:solidFill>
                   <a:schemeClr val="tx1"/>
                 </a:solidFill>
@@ -3381,8 +3410,8 @@
         </p:nvSpPr>
         <p:spPr>
           <a:xfrm>
-            <a:off x="171454" y="781963"/>
-            <a:ext cx="5205721" cy="378000"/>
+            <a:off x="171457" y="1400294"/>
+            <a:ext cx="3863922" cy="378000"/>
           </a:xfrm>
           <a:prstGeom prst="roundRect">
             <a:avLst/>
@@ -3416,7 +3445,7 @@
           <a:p>
             <a:pPr algn="ctr"/>
             <a:r>
-              <a:rPr lang="de-DE" sz="1100" dirty="0" err="1" smtClean="0">
+              <a:rPr lang="de-DE" sz="1100" dirty="0" err="1">
                 <a:solidFill>
                   <a:schemeClr val="tx1"/>
                 </a:solidFill>
@@ -3437,18 +3466,10 @@
                   <a:schemeClr val="tx1"/>
                 </a:solidFill>
               </a:rPr>
-              <a:t>e.g. </a:t>
-            </a:r>
-            <a:r>
-              <a:rPr lang="de-DE" sz="1100" dirty="0" smtClean="0">
-                <a:solidFill>
-                  <a:schemeClr val="tx1"/>
-                </a:solidFill>
-              </a:rPr>
-              <a:t>R/</a:t>
-            </a:r>
-            <a:r>
-              <a:rPr lang="de-DE" sz="1100" dirty="0" err="1" smtClean="0">
+              <a:t>e.g. R/</a:t>
+            </a:r>
+            <a:r>
+              <a:rPr lang="de-DE" sz="1100" dirty="0" err="1">
                 <a:solidFill>
                   <a:schemeClr val="tx1"/>
                 </a:solidFill>
@@ -3456,7 +3477,7 @@
               <a:t>Bioconductor</a:t>
             </a:r>
             <a:r>
-              <a:rPr lang="de-DE" sz="1100" dirty="0" smtClean="0">
+              <a:rPr lang="de-DE" sz="1100" dirty="0">
                 <a:solidFill>
                   <a:schemeClr val="tx1"/>
                 </a:solidFill>
@@ -3464,7 +3485,7 @@
               <a:t>, </a:t>
             </a:r>
             <a:r>
-              <a:rPr lang="de-DE" sz="1100" dirty="0" err="1" smtClean="0">
+              <a:rPr lang="de-DE" sz="1100" dirty="0" err="1">
                 <a:solidFill>
                   <a:schemeClr val="tx1"/>
                 </a:solidFill>
@@ -3472,50 +3493,13 @@
               <a:t>GeneData</a:t>
             </a:r>
             <a:r>
-              <a:rPr lang="de-DE" sz="1100" dirty="0" smtClean="0">
-                <a:solidFill>
-                  <a:schemeClr val="tx1"/>
-                </a:solidFill>
-              </a:rPr>
-              <a:t> Expressionist, </a:t>
-            </a:r>
-            <a:r>
-              <a:rPr lang="de-DE" sz="1100" dirty="0" err="1" smtClean="0">
-                <a:solidFill>
-                  <a:schemeClr val="tx1"/>
-                </a:solidFill>
-              </a:rPr>
-              <a:t>Spotfire</a:t>
-            </a:r>
-            <a:r>
-              <a:rPr lang="de-DE" sz="1100" dirty="0" smtClean="0">
-                <a:solidFill>
-                  <a:schemeClr val="tx1"/>
-                </a:solidFill>
-              </a:rPr>
-              <a:t> </a:t>
-            </a:r>
-            <a:r>
-              <a:rPr lang="de-DE" sz="1100" dirty="0" err="1" smtClean="0">
-                <a:solidFill>
-                  <a:schemeClr val="tx1"/>
-                </a:solidFill>
-              </a:rPr>
-              <a:t>DecisionSite</a:t>
-            </a:r>
-            <a:r>
-              <a:rPr lang="de-DE" sz="1100" dirty="0" smtClean="0">
-                <a:solidFill>
-                  <a:schemeClr val="tx1"/>
-                </a:solidFill>
-              </a:rPr>
-              <a:t> </a:t>
-            </a:r>
-            <a:endParaRPr lang="de-DE" sz="1100" dirty="0">
-              <a:solidFill>
-                <a:schemeClr val="tx1"/>
-              </a:solidFill>
-            </a:endParaRPr>
+              <a:rPr lang="de-DE" sz="1100" dirty="0">
+                <a:solidFill>
+                  <a:schemeClr val="tx1"/>
+                </a:solidFill>
+              </a:rPr>
+              <a:t> Expressionist</a:t>
+            </a:r>
           </a:p>
         </p:txBody>
       </p:sp>
@@ -3527,7 +3511,7 @@
         </p:nvSpPr>
         <p:spPr>
           <a:xfrm>
-            <a:off x="171456" y="1468070"/>
+            <a:off x="171464" y="2089259"/>
             <a:ext cx="6547503" cy="378000"/>
           </a:xfrm>
           <a:prstGeom prst="roundRect">
@@ -3682,7 +3666,7 @@
               <a:t>e.g. </a:t>
             </a:r>
             <a:r>
-              <a:rPr lang="de-DE" sz="1100" smtClean="0">
+              <a:rPr lang="de-DE" sz="1100">
                 <a:solidFill>
                   <a:schemeClr val="tx1"/>
                 </a:solidFill>
@@ -3708,7 +3692,7 @@
         </p:nvSpPr>
         <p:spPr>
           <a:xfrm>
-            <a:off x="694535" y="470570"/>
+            <a:off x="694535" y="1091758"/>
             <a:ext cx="134216" cy="287772"/>
           </a:xfrm>
           <a:prstGeom prst="downArrow">
@@ -3748,7 +3732,7 @@
         </p:nvSpPr>
         <p:spPr>
           <a:xfrm>
-            <a:off x="2036314" y="470570"/>
+            <a:off x="2036314" y="1091758"/>
             <a:ext cx="134216" cy="287772"/>
           </a:xfrm>
           <a:prstGeom prst="downArrow">
@@ -3788,7 +3772,7 @@
         </p:nvSpPr>
         <p:spPr>
           <a:xfrm>
-            <a:off x="3378093" y="470570"/>
+            <a:off x="3378093" y="1091758"/>
             <a:ext cx="134216" cy="287772"/>
           </a:xfrm>
           <a:prstGeom prst="downArrow">
@@ -3822,13 +3806,13 @@
       </p:sp>
       <p:sp>
         <p:nvSpPr>
-          <p:cNvPr id="16" name="Pfeil nach unten 15"/>
+          <p:cNvPr id="17" name="Pfeil nach unten 16"/>
           <p:cNvSpPr/>
           <p:nvPr/>
         </p:nvSpPr>
         <p:spPr>
           <a:xfrm>
-            <a:off x="4719872" y="470570"/>
+            <a:off x="6061652" y="1094139"/>
             <a:ext cx="134216" cy="287772"/>
           </a:xfrm>
           <a:prstGeom prst="downArrow">
@@ -3862,13 +3846,13 @@
       </p:sp>
       <p:sp>
         <p:nvSpPr>
-          <p:cNvPr id="17" name="Pfeil nach unten 16"/>
+          <p:cNvPr id="18" name="Pfeil nach unten 17"/>
           <p:cNvSpPr/>
           <p:nvPr/>
         </p:nvSpPr>
         <p:spPr>
           <a:xfrm>
-            <a:off x="6061652" y="470570"/>
+            <a:off x="5387730" y="1782641"/>
             <a:ext cx="134216" cy="287772"/>
           </a:xfrm>
           <a:prstGeom prst="downArrow">
@@ -3902,13 +3886,13 @@
       </p:sp>
       <p:sp>
         <p:nvSpPr>
-          <p:cNvPr id="18" name="Pfeil nach unten 17"/>
+          <p:cNvPr id="19" name="Pfeil nach unten 18"/>
           <p:cNvSpPr/>
           <p:nvPr/>
         </p:nvSpPr>
         <p:spPr>
           <a:xfrm>
-            <a:off x="6061652" y="1162181"/>
+            <a:off x="2036310" y="1783078"/>
             <a:ext cx="134216" cy="287772"/>
           </a:xfrm>
           <a:prstGeom prst="downArrow">
@@ -3942,53 +3926,13 @@
       </p:sp>
       <p:sp>
         <p:nvSpPr>
-          <p:cNvPr id="19" name="Pfeil nach unten 18"/>
-          <p:cNvSpPr/>
-          <p:nvPr/>
-        </p:nvSpPr>
-        <p:spPr>
-          <a:xfrm>
-            <a:off x="2707202" y="1162181"/>
-            <a:ext cx="134216" cy="287772"/>
-          </a:xfrm>
-          <a:prstGeom prst="downArrow">
-            <a:avLst/>
-          </a:prstGeom>
-        </p:spPr>
-        <p:style>
-          <a:lnRef idx="2">
-            <a:schemeClr val="dk1">
-              <a:shade val="50000"/>
-            </a:schemeClr>
-          </a:lnRef>
-          <a:fillRef idx="1">
-            <a:schemeClr val="dk1"/>
-          </a:fillRef>
-          <a:effectRef idx="0">
-            <a:schemeClr val="dk1"/>
-          </a:effectRef>
-          <a:fontRef idx="minor">
-            <a:schemeClr val="lt1"/>
-          </a:fontRef>
-        </p:style>
-        <p:txBody>
-          <a:bodyPr rtlCol="0" anchor="ctr"/>
-          <a:lstStyle/>
-          <a:p>
-            <a:pPr algn="ctr"/>
-            <a:endParaRPr lang="de-DE" sz="1801"/>
-          </a:p>
-        </p:txBody>
-      </p:sp>
-      <p:sp>
-        <p:nvSpPr>
           <p:cNvPr id="20" name="Abgerundetes Rechteck 19"/>
           <p:cNvSpPr/>
           <p:nvPr/>
         </p:nvSpPr>
         <p:spPr>
           <a:xfrm>
-            <a:off x="171456" y="2838434"/>
+            <a:off x="171464" y="3464385"/>
             <a:ext cx="6547503" cy="5551812"/>
           </a:xfrm>
           <a:prstGeom prst="roundRect">
@@ -4044,7 +3988,7 @@
         </p:nvSpPr>
         <p:spPr>
           <a:xfrm>
-            <a:off x="181501" y="2797074"/>
+            <a:off x="181501" y="3423025"/>
             <a:ext cx="1170330" cy="338554"/>
           </a:xfrm>
           <a:prstGeom prst="rect">
@@ -4088,7 +4032,7 @@
         </p:blipFill>
         <p:spPr>
           <a:xfrm>
-            <a:off x="389733" y="3105908"/>
+            <a:off x="389733" y="3731859"/>
             <a:ext cx="594360" cy="594360"/>
           </a:xfrm>
           <a:prstGeom prst="rect">
@@ -4104,7 +4048,7 @@
         </p:nvSpPr>
         <p:spPr>
           <a:xfrm>
-            <a:off x="1351836" y="4192765"/>
+            <a:off x="1351836" y="4818716"/>
             <a:ext cx="1847850" cy="378000"/>
           </a:xfrm>
           <a:prstGeom prst="roundRect">
@@ -4186,7 +4130,7 @@
         </p:nvSpPr>
         <p:spPr>
           <a:xfrm>
-            <a:off x="3684649" y="4193710"/>
+            <a:off x="3684649" y="4819661"/>
             <a:ext cx="1847850" cy="378000"/>
           </a:xfrm>
           <a:prstGeom prst="roundRect">
@@ -4268,7 +4212,7 @@
         </p:nvSpPr>
         <p:spPr>
           <a:xfrm>
-            <a:off x="626242" y="6416830"/>
+            <a:off x="626250" y="7042781"/>
             <a:ext cx="2573447" cy="1875514"/>
           </a:xfrm>
           <a:prstGeom prst="roundRect">
@@ -4416,7 +4360,7 @@
         </p:nvSpPr>
         <p:spPr>
           <a:xfrm>
-            <a:off x="3684652" y="6420005"/>
+            <a:off x="3684660" y="7045956"/>
             <a:ext cx="2573447" cy="1875514"/>
           </a:xfrm>
           <a:prstGeom prst="roundRect">
@@ -4556,7 +4500,7 @@
         </p:blipFill>
         <p:spPr>
           <a:xfrm>
-            <a:off x="3779523" y="6813528"/>
+            <a:off x="3779531" y="7439487"/>
             <a:ext cx="2381469" cy="1432387"/>
           </a:xfrm>
           <a:prstGeom prst="rect">
@@ -4580,7 +4524,7 @@
         </p:blipFill>
         <p:spPr>
           <a:xfrm>
-            <a:off x="1319213" y="4818838"/>
+            <a:off x="1319213" y="5444789"/>
             <a:ext cx="4252916" cy="1341346"/>
           </a:xfrm>
           <a:prstGeom prst="rect">
@@ -4596,7 +4540,7 @@
         </p:nvSpPr>
         <p:spPr>
           <a:xfrm>
-            <a:off x="2208653" y="4579731"/>
+            <a:off x="2208653" y="5205690"/>
             <a:ext cx="134216" cy="251009"/>
           </a:xfrm>
           <a:prstGeom prst="downArrow">
@@ -4636,7 +4580,7 @@
         </p:nvSpPr>
         <p:spPr>
           <a:xfrm>
-            <a:off x="4541463" y="4575155"/>
+            <a:off x="4541463" y="5201106"/>
             <a:ext cx="134216" cy="255582"/>
           </a:xfrm>
           <a:prstGeom prst="downArrow">
@@ -4676,7 +4620,7 @@
         </p:nvSpPr>
         <p:spPr>
           <a:xfrm>
-            <a:off x="3378093" y="2530489"/>
+            <a:off x="3378093" y="3156440"/>
             <a:ext cx="134216" cy="415386"/>
           </a:xfrm>
           <a:prstGeom prst="downArrow">
@@ -4724,7 +4668,7 @@
         </p:blipFill>
         <p:spPr>
           <a:xfrm>
-            <a:off x="2212315" y="3158640"/>
+            <a:off x="2212315" y="3784599"/>
             <a:ext cx="2498676" cy="739775"/>
           </a:xfrm>
           <a:prstGeom prst="rect">
@@ -4740,7 +4684,7 @@
         </p:nvSpPr>
         <p:spPr>
           <a:xfrm>
-            <a:off x="2094880" y="2965753"/>
+            <a:off x="2094888" y="3591712"/>
             <a:ext cx="2734295" cy="945177"/>
           </a:xfrm>
           <a:prstGeom prst="roundRect">
@@ -4856,7 +4800,7 @@
         </p:nvSpPr>
         <p:spPr>
           <a:xfrm>
-            <a:off x="2208653" y="3921345"/>
+            <a:off x="2208653" y="4547304"/>
             <a:ext cx="134216" cy="251009"/>
           </a:xfrm>
           <a:prstGeom prst="downArrow">
@@ -4896,7 +4840,7 @@
         </p:nvSpPr>
         <p:spPr>
           <a:xfrm>
-            <a:off x="4541463" y="3916771"/>
+            <a:off x="4541463" y="4542722"/>
             <a:ext cx="134216" cy="255582"/>
           </a:xfrm>
           <a:prstGeom prst="downArrow">
@@ -4936,7 +4880,7 @@
         </p:nvSpPr>
         <p:spPr>
           <a:xfrm>
-            <a:off x="1842760" y="6145785"/>
+            <a:off x="1842760" y="6771744"/>
             <a:ext cx="134216" cy="251009"/>
           </a:xfrm>
           <a:prstGeom prst="downArrow">
@@ -4976,7 +4920,7 @@
         </p:nvSpPr>
         <p:spPr>
           <a:xfrm>
-            <a:off x="4903146" y="6143743"/>
+            <a:off x="4903146" y="6769694"/>
             <a:ext cx="134216" cy="255582"/>
           </a:xfrm>
           <a:prstGeom prst="downArrow">
@@ -5024,7 +4968,7 @@
         </p:blipFill>
         <p:spPr>
           <a:xfrm>
-            <a:off x="758304" y="6811142"/>
+            <a:off x="758312" y="7437101"/>
             <a:ext cx="2332555" cy="1434773"/>
           </a:xfrm>
           <a:prstGeom prst="rect">
@@ -5040,7 +4984,7 @@
         </p:nvSpPr>
         <p:spPr>
           <a:xfrm>
-            <a:off x="171456" y="2145545"/>
+            <a:off x="171464" y="2771496"/>
             <a:ext cx="6547503" cy="378000"/>
           </a:xfrm>
           <a:prstGeom prst="roundRect">
@@ -5075,7 +5019,7 @@
           <a:p>
             <a:pPr algn="ctr"/>
             <a:r>
-              <a:rPr lang="de-DE" sz="1100" dirty="0" smtClean="0">
+              <a:rPr lang="de-DE" sz="1100" dirty="0">
                 <a:solidFill>
                   <a:schemeClr val="tx1"/>
                 </a:solidFill>
@@ -5083,7 +5027,7 @@
               <a:t>Annotation </a:t>
             </a:r>
             <a:r>
-              <a:rPr lang="de-DE" sz="1100" dirty="0" err="1" smtClean="0">
+              <a:rPr lang="de-DE" sz="1100" dirty="0" err="1">
                 <a:solidFill>
                   <a:schemeClr val="tx1"/>
                 </a:solidFill>
@@ -5091,7 +5035,7 @@
               <a:t>with</a:t>
             </a:r>
             <a:r>
-              <a:rPr lang="de-DE" sz="1100" dirty="0" smtClean="0">
+              <a:rPr lang="de-DE" sz="1100" dirty="0">
                 <a:solidFill>
                   <a:schemeClr val="tx1"/>
                 </a:solidFill>
@@ -5099,7 +5043,7 @@
               <a:t> </a:t>
             </a:r>
             <a:r>
-              <a:rPr lang="de-DE" sz="1100" dirty="0" err="1" smtClean="0">
+              <a:rPr lang="de-DE" sz="1100" dirty="0" err="1">
                 <a:solidFill>
                   <a:schemeClr val="tx1"/>
                 </a:solidFill>
@@ -5107,7 +5051,39 @@
               <a:t>gene</a:t>
             </a:r>
             <a:r>
-              <a:rPr lang="de-DE" sz="1100" dirty="0" smtClean="0">
+              <a:rPr lang="de-DE" sz="1100" dirty="0">
+                <a:solidFill>
+                  <a:schemeClr val="tx1"/>
+                </a:solidFill>
+              </a:rPr>
+              <a:t>, </a:t>
+            </a:r>
+            <a:r>
+              <a:rPr lang="de-DE" sz="1100" dirty="0" err="1">
+                <a:solidFill>
+                  <a:schemeClr val="tx1"/>
+                </a:solidFill>
+              </a:rPr>
+              <a:t>protein</a:t>
+            </a:r>
+            <a:r>
+              <a:rPr lang="de-DE" sz="1100" dirty="0">
+                <a:solidFill>
+                  <a:schemeClr val="tx1"/>
+                </a:solidFill>
+              </a:rPr>
+              <a:t>, </a:t>
+            </a:r>
+            <a:r>
+              <a:rPr lang="de-DE" sz="1100" dirty="0" err="1">
+                <a:solidFill>
+                  <a:schemeClr val="tx1"/>
+                </a:solidFill>
+              </a:rPr>
+              <a:t>and</a:t>
+            </a:r>
+            <a:r>
+              <a:rPr lang="de-DE" sz="1100" dirty="0">
                 <a:solidFill>
                   <a:schemeClr val="tx1"/>
                 </a:solidFill>
@@ -5115,15 +5091,15 @@
               <a:t> </a:t>
             </a:r>
             <a:r>
-              <a:rPr lang="de-DE" sz="1100" dirty="0" err="1" smtClean="0">
-                <a:solidFill>
-                  <a:schemeClr val="tx1"/>
-                </a:solidFill>
-              </a:rPr>
-              <a:t>and</a:t>
-            </a:r>
-            <a:r>
-              <a:rPr lang="de-DE" sz="1100" dirty="0" smtClean="0">
+              <a:rPr lang="de-DE" sz="1100" dirty="0" err="1">
+                <a:solidFill>
+                  <a:schemeClr val="tx1"/>
+                </a:solidFill>
+              </a:rPr>
+              <a:t>metabolite</a:t>
+            </a:r>
+            <a:r>
+              <a:rPr lang="de-DE" sz="1100" dirty="0">
                 <a:solidFill>
                   <a:schemeClr val="tx1"/>
                 </a:solidFill>
@@ -5131,23 +5107,7 @@
               <a:t> </a:t>
             </a:r>
             <a:r>
-              <a:rPr lang="de-DE" sz="1100" dirty="0" err="1" smtClean="0">
-                <a:solidFill>
-                  <a:schemeClr val="tx1"/>
-                </a:solidFill>
-              </a:rPr>
-              <a:t>metabolite</a:t>
-            </a:r>
-            <a:r>
-              <a:rPr lang="de-DE" sz="1100" dirty="0" smtClean="0">
-                <a:solidFill>
-                  <a:schemeClr val="tx1"/>
-                </a:solidFill>
-              </a:rPr>
-              <a:t> </a:t>
-            </a:r>
-            <a:r>
-              <a:rPr lang="de-DE" sz="1100" dirty="0" err="1" smtClean="0">
+              <a:rPr lang="de-DE" sz="1100" dirty="0" err="1">
                 <a:solidFill>
                   <a:schemeClr val="tx1"/>
                 </a:solidFill>
@@ -5170,7 +5130,495 @@
         </p:nvSpPr>
         <p:spPr>
           <a:xfrm>
-            <a:off x="3378093" y="1845403"/>
+            <a:off x="3378093" y="2464211"/>
+            <a:ext cx="134216" cy="287772"/>
+          </a:xfrm>
+          <a:prstGeom prst="downArrow">
+            <a:avLst/>
+          </a:prstGeom>
+        </p:spPr>
+        <p:style>
+          <a:lnRef idx="2">
+            <a:schemeClr val="dk1">
+              <a:shade val="50000"/>
+            </a:schemeClr>
+          </a:lnRef>
+          <a:fillRef idx="1">
+            <a:schemeClr val="dk1"/>
+          </a:fillRef>
+          <a:effectRef idx="0">
+            <a:schemeClr val="dk1"/>
+          </a:effectRef>
+          <a:fontRef idx="minor">
+            <a:schemeClr val="lt1"/>
+          </a:fontRef>
+        </p:style>
+        <p:txBody>
+          <a:bodyPr rtlCol="0" anchor="ctr"/>
+          <a:lstStyle/>
+          <a:p>
+            <a:pPr algn="ctr"/>
+            <a:endParaRPr lang="de-DE" sz="1801"/>
+          </a:p>
+        </p:txBody>
+      </p:sp>
+      <p:sp>
+        <p:nvSpPr>
+          <p:cNvPr id="39" name="Abgerundetes Rechteck 38"/>
+          <p:cNvSpPr/>
+          <p:nvPr/>
+        </p:nvSpPr>
+        <p:spPr>
+          <a:xfrm>
+            <a:off x="171462" y="28346"/>
+            <a:ext cx="1180381" cy="378000"/>
+          </a:xfrm>
+          <a:prstGeom prst="roundRect">
+            <a:avLst/>
+          </a:prstGeom>
+          <a:noFill/>
+          <a:ln w="19050">
+            <a:solidFill>
+              <a:schemeClr val="tx1"/>
+            </a:solidFill>
+          </a:ln>
+        </p:spPr>
+        <p:style>
+          <a:lnRef idx="2">
+            <a:schemeClr val="accent1">
+              <a:shade val="50000"/>
+            </a:schemeClr>
+          </a:lnRef>
+          <a:fillRef idx="1">
+            <a:schemeClr val="accent1"/>
+          </a:fillRef>
+          <a:effectRef idx="0">
+            <a:schemeClr val="accent1"/>
+          </a:effectRef>
+          <a:fontRef idx="minor">
+            <a:schemeClr val="lt1"/>
+          </a:fontRef>
+        </p:style>
+        <p:txBody>
+          <a:bodyPr rtlCol="0" anchor="ctr"/>
+          <a:lstStyle/>
+          <a:p>
+            <a:pPr algn="ctr"/>
+            <a:r>
+              <a:rPr lang="de-DE" sz="1200" dirty="0" err="1">
+                <a:solidFill>
+                  <a:schemeClr val="tx1"/>
+                </a:solidFill>
+              </a:rPr>
+              <a:t>Functional</a:t>
+            </a:r>
+            <a:r>
+              <a:rPr lang="de-DE" sz="1200" dirty="0">
+                <a:solidFill>
+                  <a:schemeClr val="tx1"/>
+                </a:solidFill>
+              </a:rPr>
+              <a:t> </a:t>
+            </a:r>
+            <a:r>
+              <a:rPr lang="de-DE" sz="1200" dirty="0" err="1">
+                <a:solidFill>
+                  <a:schemeClr val="tx1"/>
+                </a:solidFill>
+              </a:rPr>
+              <a:t>genomics</a:t>
+            </a:r>
+            <a:endParaRPr lang="de-DE" sz="1200" dirty="0">
+              <a:solidFill>
+                <a:schemeClr val="tx1"/>
+              </a:solidFill>
+            </a:endParaRPr>
+          </a:p>
+        </p:txBody>
+      </p:sp>
+      <p:sp>
+        <p:nvSpPr>
+          <p:cNvPr id="43" name="Abgerundetes Rechteck 42"/>
+          <p:cNvSpPr/>
+          <p:nvPr/>
+        </p:nvSpPr>
+        <p:spPr>
+          <a:xfrm>
+            <a:off x="4196803" y="24451"/>
+            <a:ext cx="1180381" cy="378000"/>
+          </a:xfrm>
+          <a:prstGeom prst="roundRect">
+            <a:avLst/>
+          </a:prstGeom>
+          <a:noFill/>
+          <a:ln w="19050">
+            <a:solidFill>
+              <a:schemeClr val="tx1"/>
+            </a:solidFill>
+          </a:ln>
+        </p:spPr>
+        <p:style>
+          <a:lnRef idx="2">
+            <a:schemeClr val="accent1">
+              <a:shade val="50000"/>
+            </a:schemeClr>
+          </a:lnRef>
+          <a:fillRef idx="1">
+            <a:schemeClr val="accent1"/>
+          </a:fillRef>
+          <a:effectRef idx="0">
+            <a:schemeClr val="accent1"/>
+          </a:effectRef>
+          <a:fontRef idx="minor">
+            <a:schemeClr val="lt1"/>
+          </a:fontRef>
+        </p:style>
+        <p:txBody>
+          <a:bodyPr rtlCol="0" anchor="ctr"/>
+          <a:lstStyle/>
+          <a:p>
+            <a:pPr algn="ctr"/>
+            <a:r>
+              <a:rPr lang="de-DE" sz="1200" dirty="0" err="1">
+                <a:solidFill>
+                  <a:schemeClr val="tx1"/>
+                </a:solidFill>
+              </a:rPr>
+              <a:t>Proteomics</a:t>
+            </a:r>
+            <a:endParaRPr lang="de-DE" sz="1200" dirty="0">
+              <a:solidFill>
+                <a:schemeClr val="tx1"/>
+              </a:solidFill>
+            </a:endParaRPr>
+          </a:p>
+        </p:txBody>
+      </p:sp>
+      <p:sp>
+        <p:nvSpPr>
+          <p:cNvPr id="48" name="Abgerundetes Rechteck 47"/>
+          <p:cNvSpPr/>
+          <p:nvPr/>
+        </p:nvSpPr>
+        <p:spPr>
+          <a:xfrm>
+            <a:off x="1513239" y="24885"/>
+            <a:ext cx="2522140" cy="378000"/>
+          </a:xfrm>
+          <a:prstGeom prst="roundRect">
+            <a:avLst/>
+          </a:prstGeom>
+          <a:noFill/>
+          <a:ln w="19050">
+            <a:solidFill>
+              <a:schemeClr val="tx1"/>
+            </a:solidFill>
+          </a:ln>
+        </p:spPr>
+        <p:style>
+          <a:lnRef idx="2">
+            <a:schemeClr val="accent1">
+              <a:shade val="50000"/>
+            </a:schemeClr>
+          </a:lnRef>
+          <a:fillRef idx="1">
+            <a:schemeClr val="accent1"/>
+          </a:fillRef>
+          <a:effectRef idx="0">
+            <a:schemeClr val="accent1"/>
+          </a:effectRef>
+          <a:fontRef idx="minor">
+            <a:schemeClr val="lt1"/>
+          </a:fontRef>
+        </p:style>
+        <p:txBody>
+          <a:bodyPr rtlCol="0" anchor="ctr"/>
+          <a:lstStyle/>
+          <a:p>
+            <a:pPr algn="ctr"/>
+            <a:r>
+              <a:rPr lang="de-DE" sz="1200" dirty="0" err="1">
+                <a:solidFill>
+                  <a:schemeClr val="tx1"/>
+                </a:solidFill>
+              </a:rPr>
+              <a:t>Transcriptomics</a:t>
+            </a:r>
+            <a:endParaRPr lang="de-DE" sz="1200" dirty="0">
+              <a:solidFill>
+                <a:schemeClr val="tx1"/>
+              </a:solidFill>
+            </a:endParaRPr>
+          </a:p>
+        </p:txBody>
+      </p:sp>
+      <p:sp>
+        <p:nvSpPr>
+          <p:cNvPr id="49" name="Abgerundetes Rechteck 48"/>
+          <p:cNvSpPr/>
+          <p:nvPr/>
+        </p:nvSpPr>
+        <p:spPr>
+          <a:xfrm>
+            <a:off x="5538586" y="27997"/>
+            <a:ext cx="1180381" cy="378000"/>
+          </a:xfrm>
+          <a:prstGeom prst="roundRect">
+            <a:avLst/>
+          </a:prstGeom>
+          <a:noFill/>
+          <a:ln w="19050">
+            <a:solidFill>
+              <a:schemeClr val="tx1"/>
+            </a:solidFill>
+          </a:ln>
+        </p:spPr>
+        <p:style>
+          <a:lnRef idx="2">
+            <a:schemeClr val="accent1">
+              <a:shade val="50000"/>
+            </a:schemeClr>
+          </a:lnRef>
+          <a:fillRef idx="1">
+            <a:schemeClr val="accent1"/>
+          </a:fillRef>
+          <a:effectRef idx="0">
+            <a:schemeClr val="accent1"/>
+          </a:effectRef>
+          <a:fontRef idx="minor">
+            <a:schemeClr val="lt1"/>
+          </a:fontRef>
+        </p:style>
+        <p:txBody>
+          <a:bodyPr rtlCol="0" anchor="ctr"/>
+          <a:lstStyle/>
+          <a:p>
+            <a:pPr algn="ctr"/>
+            <a:r>
+              <a:rPr lang="de-DE" sz="1200" dirty="0" err="1">
+                <a:solidFill>
+                  <a:schemeClr val="tx1"/>
+                </a:solidFill>
+              </a:rPr>
+              <a:t>Metabolomics</a:t>
+            </a:r>
+            <a:endParaRPr lang="de-DE" sz="1200" dirty="0">
+              <a:solidFill>
+                <a:schemeClr val="tx1"/>
+              </a:solidFill>
+            </a:endParaRPr>
+          </a:p>
+        </p:txBody>
+      </p:sp>
+      <p:sp>
+        <p:nvSpPr>
+          <p:cNvPr id="50" name="Pfeil nach unten 49"/>
+          <p:cNvSpPr/>
+          <p:nvPr/>
+        </p:nvSpPr>
+        <p:spPr>
+          <a:xfrm>
+            <a:off x="694535" y="404041"/>
+            <a:ext cx="134216" cy="287772"/>
+          </a:xfrm>
+          <a:prstGeom prst="downArrow">
+            <a:avLst/>
+          </a:prstGeom>
+        </p:spPr>
+        <p:style>
+          <a:lnRef idx="2">
+            <a:schemeClr val="dk1">
+              <a:shade val="50000"/>
+            </a:schemeClr>
+          </a:lnRef>
+          <a:fillRef idx="1">
+            <a:schemeClr val="dk1"/>
+          </a:fillRef>
+          <a:effectRef idx="0">
+            <a:schemeClr val="dk1"/>
+          </a:effectRef>
+          <a:fontRef idx="minor">
+            <a:schemeClr val="lt1"/>
+          </a:fontRef>
+        </p:style>
+        <p:txBody>
+          <a:bodyPr rtlCol="0" anchor="ctr"/>
+          <a:lstStyle/>
+          <a:p>
+            <a:pPr algn="ctr"/>
+            <a:endParaRPr lang="de-DE" sz="1801"/>
+          </a:p>
+        </p:txBody>
+      </p:sp>
+      <p:sp>
+        <p:nvSpPr>
+          <p:cNvPr id="51" name="Pfeil nach unten 50"/>
+          <p:cNvSpPr/>
+          <p:nvPr/>
+        </p:nvSpPr>
+        <p:spPr>
+          <a:xfrm>
+            <a:off x="2036314" y="396898"/>
+            <a:ext cx="134216" cy="287772"/>
+          </a:xfrm>
+          <a:prstGeom prst="downArrow">
+            <a:avLst/>
+          </a:prstGeom>
+        </p:spPr>
+        <p:style>
+          <a:lnRef idx="2">
+            <a:schemeClr val="dk1">
+              <a:shade val="50000"/>
+            </a:schemeClr>
+          </a:lnRef>
+          <a:fillRef idx="1">
+            <a:schemeClr val="dk1"/>
+          </a:fillRef>
+          <a:effectRef idx="0">
+            <a:schemeClr val="dk1"/>
+          </a:effectRef>
+          <a:fontRef idx="minor">
+            <a:schemeClr val="lt1"/>
+          </a:fontRef>
+        </p:style>
+        <p:txBody>
+          <a:bodyPr rtlCol="0" anchor="ctr"/>
+          <a:lstStyle/>
+          <a:p>
+            <a:pPr algn="ctr"/>
+            <a:endParaRPr lang="de-DE" sz="1801"/>
+          </a:p>
+        </p:txBody>
+      </p:sp>
+      <p:sp>
+        <p:nvSpPr>
+          <p:cNvPr id="52" name="Pfeil nach unten 51"/>
+          <p:cNvSpPr/>
+          <p:nvPr/>
+        </p:nvSpPr>
+        <p:spPr>
+          <a:xfrm>
+            <a:off x="3378093" y="399279"/>
+            <a:ext cx="134216" cy="287772"/>
+          </a:xfrm>
+          <a:prstGeom prst="downArrow">
+            <a:avLst/>
+          </a:prstGeom>
+        </p:spPr>
+        <p:style>
+          <a:lnRef idx="2">
+            <a:schemeClr val="dk1">
+              <a:shade val="50000"/>
+            </a:schemeClr>
+          </a:lnRef>
+          <a:fillRef idx="1">
+            <a:schemeClr val="dk1"/>
+          </a:fillRef>
+          <a:effectRef idx="0">
+            <a:schemeClr val="dk1"/>
+          </a:effectRef>
+          <a:fontRef idx="minor">
+            <a:schemeClr val="lt1"/>
+          </a:fontRef>
+        </p:style>
+        <p:txBody>
+          <a:bodyPr rtlCol="0" anchor="ctr"/>
+          <a:lstStyle/>
+          <a:p>
+            <a:pPr algn="ctr"/>
+            <a:endParaRPr lang="de-DE" sz="1801"/>
+          </a:p>
+        </p:txBody>
+      </p:sp>
+      <p:sp>
+        <p:nvSpPr>
+          <p:cNvPr id="53" name="Pfeil nach unten 52"/>
+          <p:cNvSpPr/>
+          <p:nvPr/>
+        </p:nvSpPr>
+        <p:spPr>
+          <a:xfrm>
+            <a:off x="4719872" y="399279"/>
+            <a:ext cx="134216" cy="287772"/>
+          </a:xfrm>
+          <a:prstGeom prst="downArrow">
+            <a:avLst/>
+          </a:prstGeom>
+        </p:spPr>
+        <p:style>
+          <a:lnRef idx="2">
+            <a:schemeClr val="dk1">
+              <a:shade val="50000"/>
+            </a:schemeClr>
+          </a:lnRef>
+          <a:fillRef idx="1">
+            <a:schemeClr val="dk1"/>
+          </a:fillRef>
+          <a:effectRef idx="0">
+            <a:schemeClr val="dk1"/>
+          </a:effectRef>
+          <a:fontRef idx="minor">
+            <a:schemeClr val="lt1"/>
+          </a:fontRef>
+        </p:style>
+        <p:txBody>
+          <a:bodyPr rtlCol="0" anchor="ctr"/>
+          <a:lstStyle/>
+          <a:p>
+            <a:pPr algn="ctr"/>
+            <a:endParaRPr lang="de-DE" sz="1801"/>
+          </a:p>
+        </p:txBody>
+      </p:sp>
+      <p:sp>
+        <p:nvSpPr>
+          <p:cNvPr id="54" name="Pfeil nach unten 53"/>
+          <p:cNvSpPr/>
+          <p:nvPr/>
+        </p:nvSpPr>
+        <p:spPr>
+          <a:xfrm>
+            <a:off x="6061652" y="404041"/>
+            <a:ext cx="134216" cy="287772"/>
+          </a:xfrm>
+          <a:prstGeom prst="downArrow">
+            <a:avLst/>
+          </a:prstGeom>
+        </p:spPr>
+        <p:style>
+          <a:lnRef idx="2">
+            <a:schemeClr val="dk1">
+              <a:shade val="50000"/>
+            </a:schemeClr>
+          </a:lnRef>
+          <a:fillRef idx="1">
+            <a:schemeClr val="dk1"/>
+          </a:fillRef>
+          <a:effectRef idx="0">
+            <a:schemeClr val="dk1"/>
+          </a:effectRef>
+          <a:fontRef idx="minor">
+            <a:schemeClr val="lt1"/>
+          </a:fontRef>
+        </p:style>
+        <p:txBody>
+          <a:bodyPr rtlCol="0" anchor="ctr"/>
+          <a:lstStyle/>
+          <a:p>
+            <a:pPr algn="ctr"/>
+            <a:endParaRPr lang="de-DE" sz="1801"/>
+          </a:p>
+        </p:txBody>
+      </p:sp>
+      <p:sp>
+        <p:nvSpPr>
+          <p:cNvPr id="55" name="Pfeil nach unten 54"/>
+          <p:cNvSpPr/>
+          <p:nvPr/>
+        </p:nvSpPr>
+        <p:spPr>
+          <a:xfrm>
+            <a:off x="4719872" y="1090437"/>
             <a:ext cx="134216" cy="287772"/>
           </a:xfrm>
           <a:prstGeom prst="downArrow">
@@ -5333,7 +5781,7 @@
     </a:clrScheme>
     <a:fontScheme name="Larissa">
       <a:majorFont>
-        <a:latin typeface="Calibri Light"/>
+        <a:latin typeface="Calibri Light" panose="020F0302020204030204"/>
         <a:ea typeface=""/>
         <a:cs typeface=""/>
         <a:font script="Jpan" typeface="ＭＳ Ｐゴシック"/>
@@ -5368,7 +5816,7 @@
         <a:font script="Geor" typeface="Sylfaen"/>
       </a:majorFont>
       <a:minorFont>
-        <a:latin typeface="Calibri"/>
+        <a:latin typeface="Calibri" panose="020F0502020204030204"/>
         <a:ea typeface=""/>
         <a:cs typeface=""/>
         <a:font script="Jpan" typeface="ＭＳ Ｐゴシック"/>

</xml_diff>